<commit_message>
Update code for first set of revisions
</commit_message>
<xml_diff>
--- a/plots/supplementary/fault/figures.pptx
+++ b/plots/supplementary/fault/figures.pptx
@@ -1905,7 +1905,7 @@
           <a:p>
             <a:fld id="{C1B87537-0585-8848-95C2-C0C08B457C77}" type="datetimeFigureOut">
               <a:rPr lang="en-US" smtClean="0"/>
-              <a:t>9/25/24</a:t>
+              <a:t>12/30/24</a:t>
             </a:fld>
             <a:endParaRPr lang="en-US"/>
           </a:p>
@@ -2574,7 +2574,7 @@
           <a:p>
             <a:fld id="{89F9FEAC-3A5F-F843-BF6D-FFC8149CCB8B}" type="datetimeFigureOut">
               <a:rPr lang="en-US" smtClean="0"/>
-              <a:t>9/25/24</a:t>
+              <a:t>12/30/24</a:t>
             </a:fld>
             <a:endParaRPr lang="en-US"/>
           </a:p>
@@ -2774,7 +2774,7 @@
           <a:p>
             <a:fld id="{89F9FEAC-3A5F-F843-BF6D-FFC8149CCB8B}" type="datetimeFigureOut">
               <a:rPr lang="en-US" smtClean="0"/>
-              <a:t>9/25/24</a:t>
+              <a:t>12/30/24</a:t>
             </a:fld>
             <a:endParaRPr lang="en-US"/>
           </a:p>
@@ -2984,7 +2984,7 @@
           <a:p>
             <a:fld id="{89F9FEAC-3A5F-F843-BF6D-FFC8149CCB8B}" type="datetimeFigureOut">
               <a:rPr lang="en-US" smtClean="0"/>
-              <a:t>9/25/24</a:t>
+              <a:t>12/30/24</a:t>
             </a:fld>
             <a:endParaRPr lang="en-US"/>
           </a:p>
@@ -3184,7 +3184,7 @@
           <a:p>
             <a:fld id="{89F9FEAC-3A5F-F843-BF6D-FFC8149CCB8B}" type="datetimeFigureOut">
               <a:rPr lang="en-US" smtClean="0"/>
-              <a:t>9/25/24</a:t>
+              <a:t>12/30/24</a:t>
             </a:fld>
             <a:endParaRPr lang="en-US"/>
           </a:p>
@@ -3460,7 +3460,7 @@
           <a:p>
             <a:fld id="{89F9FEAC-3A5F-F843-BF6D-FFC8149CCB8B}" type="datetimeFigureOut">
               <a:rPr lang="en-US" smtClean="0"/>
-              <a:t>9/25/24</a:t>
+              <a:t>12/30/24</a:t>
             </a:fld>
             <a:endParaRPr lang="en-US"/>
           </a:p>
@@ -3728,7 +3728,7 @@
           <a:p>
             <a:fld id="{89F9FEAC-3A5F-F843-BF6D-FFC8149CCB8B}" type="datetimeFigureOut">
               <a:rPr lang="en-US" smtClean="0"/>
-              <a:t>9/25/24</a:t>
+              <a:t>12/30/24</a:t>
             </a:fld>
             <a:endParaRPr lang="en-US"/>
           </a:p>
@@ -4143,7 +4143,7 @@
           <a:p>
             <a:fld id="{89F9FEAC-3A5F-F843-BF6D-FFC8149CCB8B}" type="datetimeFigureOut">
               <a:rPr lang="en-US" smtClean="0"/>
-              <a:t>9/25/24</a:t>
+              <a:t>12/30/24</a:t>
             </a:fld>
             <a:endParaRPr lang="en-US"/>
           </a:p>
@@ -4285,7 +4285,7 @@
           <a:p>
             <a:fld id="{89F9FEAC-3A5F-F843-BF6D-FFC8149CCB8B}" type="datetimeFigureOut">
               <a:rPr lang="en-US" smtClean="0"/>
-              <a:t>9/25/24</a:t>
+              <a:t>12/30/24</a:t>
             </a:fld>
             <a:endParaRPr lang="en-US"/>
           </a:p>
@@ -4398,7 +4398,7 @@
           <a:p>
             <a:fld id="{89F9FEAC-3A5F-F843-BF6D-FFC8149CCB8B}" type="datetimeFigureOut">
               <a:rPr lang="en-US" smtClean="0"/>
-              <a:t>9/25/24</a:t>
+              <a:t>12/30/24</a:t>
             </a:fld>
             <a:endParaRPr lang="en-US"/>
           </a:p>
@@ -4711,7 +4711,7 @@
           <a:p>
             <a:fld id="{89F9FEAC-3A5F-F843-BF6D-FFC8149CCB8B}" type="datetimeFigureOut">
               <a:rPr lang="en-US" smtClean="0"/>
-              <a:t>9/25/24</a:t>
+              <a:t>12/30/24</a:t>
             </a:fld>
             <a:endParaRPr lang="en-US"/>
           </a:p>
@@ -5000,7 +5000,7 @@
           <a:p>
             <a:fld id="{89F9FEAC-3A5F-F843-BF6D-FFC8149CCB8B}" type="datetimeFigureOut">
               <a:rPr lang="en-US" smtClean="0"/>
-              <a:t>9/25/24</a:t>
+              <a:t>12/30/24</a:t>
             </a:fld>
             <a:endParaRPr lang="en-US"/>
           </a:p>
@@ -5243,7 +5243,7 @@
           <a:p>
             <a:fld id="{89F9FEAC-3A5F-F843-BF6D-FFC8149CCB8B}" type="datetimeFigureOut">
               <a:rPr lang="en-US" smtClean="0"/>
-              <a:t>9/25/24</a:t>
+              <a:t>12/30/24</a:t>
             </a:fld>
             <a:endParaRPr lang="en-US"/>
           </a:p>
@@ -6272,10 +6272,10 @@
       </p:grpSpPr>
       <p:pic>
         <p:nvPicPr>
-          <p:cNvPr id="3" name="Picture 2" descr="A white box with red spots&#10;&#10;Description automatically generated">
-            <a:extLst>
-              <a:ext uri="{FF2B5EF4-FFF2-40B4-BE49-F238E27FC236}">
-                <a16:creationId xmlns:a16="http://schemas.microsoft.com/office/drawing/2014/main" id="{50D5707B-46F7-E78D-05A4-C194751C2D7C}"/>
+          <p:cNvPr id="4" name="Picture 3" descr="A couple of red squares in a clear box&#10;&#10;Description automatically generated">
+            <a:extLst>
+              <a:ext uri="{FF2B5EF4-FFF2-40B4-BE49-F238E27FC236}">
+                <a16:creationId xmlns:a16="http://schemas.microsoft.com/office/drawing/2014/main" id="{8DC0F899-F23B-3F61-489E-E53A06047E07}"/>
               </a:ext>
             </a:extLst>
           </p:cNvPr>
@@ -6292,8 +6292,8 @@
         </p:blipFill>
         <p:spPr>
           <a:xfrm>
-            <a:off x="1179772" y="2286440"/>
-            <a:ext cx="10030168" cy="2507542"/>
+            <a:off x="1190285" y="2278970"/>
+            <a:ext cx="10030167" cy="2507542"/>
           </a:xfrm>
           <a:prstGeom prst="rect">
             <a:avLst/>

</xml_diff>